<commit_message>
Enabled type-checking when rendering Lists, so same-typed lists are marked with type and contained objects don't render any title
</commit_message>
<xml_diff>
--- a/presentations/Demo DoodleDebug Jan-2011.pptx
+++ b/presentations/Demo DoodleDebug Jan-2011.pptx
@@ -5,10 +5,8 @@
     <p:sldMasterId id="2147483648" r:id="rId1"/>
   </p:sldMasterIdLst>
   <p:sldIdLst>
-    <p:sldId id="257" r:id="rId2"/>
-    <p:sldId id="258" r:id="rId3"/>
-    <p:sldId id="259" r:id="rId4"/>
-    <p:sldId id="260" r:id="rId5"/>
+    <p:sldId id="258" r:id="rId2"/>
+    <p:sldId id="257" r:id="rId3"/>
   </p:sldIdLst>
   <p:sldSz cx="9144000" cy="6858000" type="screen4x3"/>
   <p:notesSz cx="6858000" cy="9144000"/>
@@ -291,7 +289,7 @@
           <a:p>
             <a:fld id="{6A105265-A4C7-4F15-877D-27CFEC0C4890}" type="datetimeFigureOut">
               <a:rPr lang="de-CH" smtClean="0"/>
-              <a:t>23.01.2012</a:t>
+              <a:t>27.01.2012</a:t>
             </a:fld>
             <a:endParaRPr lang="de-CH"/>
           </a:p>
@@ -461,7 +459,7 @@
           <a:p>
             <a:fld id="{6A105265-A4C7-4F15-877D-27CFEC0C4890}" type="datetimeFigureOut">
               <a:rPr lang="de-CH" smtClean="0"/>
-              <a:t>23.01.2012</a:t>
+              <a:t>27.01.2012</a:t>
             </a:fld>
             <a:endParaRPr lang="de-CH"/>
           </a:p>
@@ -641,7 +639,7 @@
           <a:p>
             <a:fld id="{6A105265-A4C7-4F15-877D-27CFEC0C4890}" type="datetimeFigureOut">
               <a:rPr lang="de-CH" smtClean="0"/>
-              <a:t>23.01.2012</a:t>
+              <a:t>27.01.2012</a:t>
             </a:fld>
             <a:endParaRPr lang="de-CH"/>
           </a:p>
@@ -811,7 +809,7 @@
           <a:p>
             <a:fld id="{6A105265-A4C7-4F15-877D-27CFEC0C4890}" type="datetimeFigureOut">
               <a:rPr lang="de-CH" smtClean="0"/>
-              <a:t>23.01.2012</a:t>
+              <a:t>27.01.2012</a:t>
             </a:fld>
             <a:endParaRPr lang="de-CH"/>
           </a:p>
@@ -1057,7 +1055,7 @@
           <a:p>
             <a:fld id="{6A105265-A4C7-4F15-877D-27CFEC0C4890}" type="datetimeFigureOut">
               <a:rPr lang="de-CH" smtClean="0"/>
-              <a:t>23.01.2012</a:t>
+              <a:t>27.01.2012</a:t>
             </a:fld>
             <a:endParaRPr lang="de-CH"/>
           </a:p>
@@ -1345,7 +1343,7 @@
           <a:p>
             <a:fld id="{6A105265-A4C7-4F15-877D-27CFEC0C4890}" type="datetimeFigureOut">
               <a:rPr lang="de-CH" smtClean="0"/>
-              <a:t>23.01.2012</a:t>
+              <a:t>27.01.2012</a:t>
             </a:fld>
             <a:endParaRPr lang="de-CH"/>
           </a:p>
@@ -1767,7 +1765,7 @@
           <a:p>
             <a:fld id="{6A105265-A4C7-4F15-877D-27CFEC0C4890}" type="datetimeFigureOut">
               <a:rPr lang="de-CH" smtClean="0"/>
-              <a:t>23.01.2012</a:t>
+              <a:t>27.01.2012</a:t>
             </a:fld>
             <a:endParaRPr lang="de-CH"/>
           </a:p>
@@ -1885,7 +1883,7 @@
           <a:p>
             <a:fld id="{6A105265-A4C7-4F15-877D-27CFEC0C4890}" type="datetimeFigureOut">
               <a:rPr lang="de-CH" smtClean="0"/>
-              <a:t>23.01.2012</a:t>
+              <a:t>27.01.2012</a:t>
             </a:fld>
             <a:endParaRPr lang="de-CH"/>
           </a:p>
@@ -1980,7 +1978,7 @@
           <a:p>
             <a:fld id="{6A105265-A4C7-4F15-877D-27CFEC0C4890}" type="datetimeFigureOut">
               <a:rPr lang="de-CH" smtClean="0"/>
-              <a:t>23.01.2012</a:t>
+              <a:t>27.01.2012</a:t>
             </a:fld>
             <a:endParaRPr lang="de-CH"/>
           </a:p>
@@ -2257,7 +2255,7 @@
           <a:p>
             <a:fld id="{6A105265-A4C7-4F15-877D-27CFEC0C4890}" type="datetimeFigureOut">
               <a:rPr lang="de-CH" smtClean="0"/>
-              <a:t>23.01.2012</a:t>
+              <a:t>27.01.2012</a:t>
             </a:fld>
             <a:endParaRPr lang="de-CH"/>
           </a:p>
@@ -2510,7 +2508,7 @@
           <a:p>
             <a:fld id="{6A105265-A4C7-4F15-877D-27CFEC0C4890}" type="datetimeFigureOut">
               <a:rPr lang="de-CH" smtClean="0"/>
-              <a:t>23.01.2012</a:t>
+              <a:t>27.01.2012</a:t>
             </a:fld>
             <a:endParaRPr lang="de-CH"/>
           </a:p>
@@ -2723,7 +2721,7 @@
           <a:p>
             <a:fld id="{6A105265-A4C7-4F15-877D-27CFEC0C4890}" type="datetimeFigureOut">
               <a:rPr lang="de-CH" smtClean="0"/>
-              <a:t>23.01.2012</a:t>
+              <a:t>27.01.2012</a:t>
             </a:fld>
             <a:endParaRPr lang="de-CH"/>
           </a:p>
@@ -3105,97 +3103,82 @@
             <a:spLocks noGrp="1"/>
           </p:cNvSpPr>
           <p:nvPr>
-            <p:ph type="ctrTitle"/>
-          </p:nvPr>
-        </p:nvSpPr>
-        <p:spPr>
-          <a:xfrm>
-            <a:off x="685800" y="1844824"/>
-            <a:ext cx="7772400" cy="1470025"/>
-          </a:xfrm>
-        </p:spPr>
+            <p:ph type="title"/>
+          </p:nvPr>
+        </p:nvSpPr>
+        <p:spPr/>
+        <p:txBody>
+          <a:bodyPr/>
+          <a:lstStyle/>
+          <a:p>
+            <a:endParaRPr lang="de-CH"/>
+          </a:p>
+        </p:txBody>
+      </p:sp>
+      <p:sp>
+        <p:nvSpPr>
+          <p:cNvPr id="3" name="Inhaltsplatzhalter 2"/>
+          <p:cNvSpPr>
+            <a:spLocks noGrp="1"/>
+          </p:cNvSpPr>
+          <p:nvPr>
+            <p:ph idx="1"/>
+          </p:nvPr>
+        </p:nvSpPr>
+        <p:spPr/>
         <p:txBody>
           <a:bodyPr>
             <a:normAutofit/>
           </a:bodyPr>
           <a:lstStyle/>
           <a:p>
-            <a:r>
-              <a:rPr lang="de-CH" sz="5400" b="1" dirty="0" err="1" smtClean="0"/>
-              <a:t>Visualizing</a:t>
-            </a:r>
-            <a:r>
-              <a:rPr lang="de-CH" sz="5400" b="1" dirty="0" smtClean="0"/>
-              <a:t> Objects in Java</a:t>
-            </a:r>
-            <a:endParaRPr lang="de-CH" sz="5400" b="1" dirty="0"/>
-          </a:p>
-        </p:txBody>
-      </p:sp>
-      <p:sp>
-        <p:nvSpPr>
-          <p:cNvPr id="3" name="Untertitel 2"/>
-          <p:cNvSpPr>
-            <a:spLocks noGrp="1"/>
-          </p:cNvSpPr>
-          <p:nvPr>
-            <p:ph type="subTitle" idx="1"/>
-          </p:nvPr>
-        </p:nvSpPr>
-        <p:spPr>
-          <a:xfrm>
-            <a:off x="1371600" y="3600599"/>
-            <a:ext cx="6400800" cy="1752600"/>
-          </a:xfrm>
-        </p:spPr>
-        <p:txBody>
-          <a:bodyPr/>
-          <a:lstStyle/>
-          <a:p>
-            <a:r>
-              <a:rPr lang="de-CH" dirty="0" err="1"/>
-              <a:t>b</a:t>
-            </a:r>
-            <a:r>
-              <a:rPr lang="de-CH" dirty="0" err="1" smtClean="0"/>
-              <a:t>etter</a:t>
-            </a:r>
-            <a:r>
-              <a:rPr lang="de-CH" dirty="0" smtClean="0"/>
-              <a:t> </a:t>
-            </a:r>
-            <a:r>
-              <a:rPr lang="de-CH" dirty="0" err="1" smtClean="0"/>
-              <a:t>than</a:t>
-            </a:r>
-            <a:r>
-              <a:rPr lang="de-CH" dirty="0" smtClean="0"/>
-              <a:t> </a:t>
-            </a:r>
-            <a:r>
-              <a:rPr lang="de-CH" dirty="0" err="1" smtClean="0"/>
-              <a:t>with</a:t>
-            </a:r>
-            <a:r>
-              <a:rPr lang="de-CH" dirty="0" smtClean="0"/>
-              <a:t> </a:t>
-            </a:r>
-            <a:r>
-              <a:rPr lang="de-CH" dirty="0" err="1" smtClean="0"/>
-              <a:t>toString</a:t>
-            </a:r>
-            <a:r>
-              <a:rPr lang="de-CH" dirty="0" smtClean="0"/>
-              <a:t>()</a:t>
-            </a:r>
-            <a:endParaRPr lang="de-CH" dirty="0"/>
+            <a:pPr marL="0" indent="0" algn="ctr">
+              <a:buNone/>
+            </a:pPr>
+            <a:r>
+              <a:rPr lang="de-CH" sz="9600" i="1" dirty="0" smtClean="0">
+                <a:solidFill>
+                  <a:schemeClr val="bg1">
+                    <a:lumMod val="65000"/>
+                  </a:schemeClr>
+                </a:solidFill>
+              </a:rPr>
+              <a:t>(</a:t>
+            </a:r>
+            <a:r>
+              <a:rPr lang="de-CH" sz="9600" i="1" dirty="0" err="1" smtClean="0">
+                <a:solidFill>
+                  <a:schemeClr val="bg1">
+                    <a:lumMod val="65000"/>
+                  </a:schemeClr>
+                </a:solidFill>
+              </a:rPr>
+              <a:t>demo</a:t>
+            </a:r>
+            <a:r>
+              <a:rPr lang="de-CH" sz="9600" i="1" dirty="0" smtClean="0">
+                <a:solidFill>
+                  <a:schemeClr val="bg1">
+                    <a:lumMod val="65000"/>
+                  </a:schemeClr>
+                </a:solidFill>
+              </a:rPr>
+              <a:t>)</a:t>
+            </a:r>
+            <a:endParaRPr lang="de-CH" sz="9600" i="1" dirty="0">
+              <a:solidFill>
+                <a:schemeClr val="bg1">
+                  <a:lumMod val="65000"/>
+                </a:schemeClr>
+              </a:solidFill>
+            </a:endParaRPr>
           </a:p>
         </p:txBody>
       </p:sp>
     </p:spTree>
     <p:extLst>
       <p:ext uri="{BB962C8B-B14F-4D97-AF65-F5344CB8AC3E}">
-        <p14:creationId xmlns:p14="http://schemas.microsoft.com/office/powerpoint/2010/main" val="3780655319"/>
+        <p14:creationId xmlns:p14="http://schemas.microsoft.com/office/powerpoint/2010/main" val="281791833"/>
       </p:ext>
     </p:extLst>
   </p:cSld>
@@ -3236,1190 +3219,85 @@
             <a:spLocks noGrp="1"/>
           </p:cNvSpPr>
           <p:nvPr>
-            <p:ph type="title"/>
+            <p:ph type="ctrTitle"/>
           </p:nvPr>
         </p:nvSpPr>
         <p:spPr>
           <a:xfrm>
-            <a:off x="457200" y="188640"/>
-            <a:ext cx="8229600" cy="1143000"/>
+            <a:off x="685800" y="1844824"/>
+            <a:ext cx="7772400" cy="1470025"/>
           </a:xfrm>
         </p:spPr>
         <p:txBody>
-          <a:bodyPr/>
-          <a:lstStyle/>
-          <a:p>
-            <a:r>
-              <a:rPr lang="de-CH" dirty="0" err="1" smtClean="0"/>
-              <a:t>Why</a:t>
-            </a:r>
-            <a:r>
-              <a:rPr lang="de-CH" dirty="0" smtClean="0"/>
-              <a:t>?</a:t>
-            </a:r>
-            <a:endParaRPr lang="de-CH" dirty="0"/>
-          </a:p>
-        </p:txBody>
-      </p:sp>
-      <p:sp>
-        <p:nvSpPr>
-          <p:cNvPr id="3" name="Inhaltsplatzhalter 2"/>
-          <p:cNvSpPr>
-            <a:spLocks noGrp="1"/>
-          </p:cNvSpPr>
-          <p:nvPr>
-            <p:ph idx="1"/>
+          <a:bodyPr>
+            <a:normAutofit/>
+          </a:bodyPr>
+          <a:lstStyle/>
+          <a:p>
+            <a:r>
+              <a:rPr lang="de-CH" sz="5400" b="1" dirty="0" err="1" smtClean="0"/>
+              <a:t>DoodleDebug</a:t>
+            </a:r>
+            <a:endParaRPr lang="de-CH" sz="5400" b="1" dirty="0"/>
+          </a:p>
+        </p:txBody>
+      </p:sp>
+      <p:sp>
+        <p:nvSpPr>
+          <p:cNvPr id="3" name="Untertitel 2"/>
+          <p:cNvSpPr>
+            <a:spLocks noGrp="1"/>
+          </p:cNvSpPr>
+          <p:nvPr>
+            <p:ph type="subTitle" idx="1"/>
           </p:nvPr>
         </p:nvSpPr>
         <p:spPr>
           <a:xfrm>
-            <a:off x="457200" y="1340768"/>
-            <a:ext cx="8229600" cy="4525963"/>
+            <a:off x="1403648" y="3645024"/>
+            <a:ext cx="6400800" cy="1752600"/>
           </a:xfrm>
         </p:spPr>
         <p:txBody>
           <a:bodyPr/>
           <a:lstStyle/>
           <a:p>
-            <a:pPr>
-              <a:buNone/>
-            </a:pPr>
-            <a:r>
-              <a:rPr lang="de-CH" sz="2800" dirty="0" smtClean="0"/>
-              <a:t>ArrayList </a:t>
-            </a:r>
-            <a:r>
-              <a:rPr lang="de-CH" sz="2800" dirty="0" err="1" smtClean="0"/>
-              <a:t>containing</a:t>
-            </a:r>
-            <a:r>
-              <a:rPr lang="de-CH" sz="2800" dirty="0" smtClean="0"/>
+            <a:r>
+              <a:rPr lang="de-CH" dirty="0" err="1"/>
+              <a:t>b</a:t>
+            </a:r>
+            <a:r>
+              <a:rPr lang="de-CH" dirty="0" err="1" smtClean="0"/>
+              <a:t>etter</a:t>
+            </a:r>
+            <a:r>
+              <a:rPr lang="de-CH" dirty="0" smtClean="0"/>
               <a:t> </a:t>
             </a:r>
             <a:r>
-              <a:rPr lang="de-CH" sz="2800" dirty="0" err="1" smtClean="0"/>
-              <a:t>some</a:t>
-            </a:r>
-            <a:r>
-              <a:rPr lang="de-CH" sz="2800" dirty="0" smtClean="0"/>
-              <a:t> Colors</a:t>
-            </a:r>
-          </a:p>
-          <a:p>
-            <a:pPr>
-              <a:buNone/>
-            </a:pPr>
-            <a:endParaRPr lang="de-CH" sz="1200" dirty="0"/>
-          </a:p>
-          <a:p>
-            <a:pPr>
-              <a:buNone/>
-            </a:pPr>
-            <a:r>
-              <a:rPr lang="de-CH" sz="2800" dirty="0" err="1" smtClean="0"/>
-              <a:t>Console</a:t>
-            </a:r>
-            <a:r>
-              <a:rPr lang="de-CH" sz="2800" dirty="0" smtClean="0"/>
+              <a:rPr lang="de-CH" dirty="0" err="1" smtClean="0"/>
+              <a:t>than</a:t>
+            </a:r>
+            <a:r>
+              <a:rPr lang="de-CH" dirty="0" smtClean="0"/>
               <a:t> </a:t>
             </a:r>
             <a:r>
-              <a:rPr lang="de-CH" sz="2800" dirty="0" err="1" smtClean="0"/>
-              <a:t>output</a:t>
-            </a:r>
-            <a:r>
-              <a:rPr lang="de-CH" sz="2800" dirty="0" smtClean="0"/>
-              <a:t> </a:t>
-            </a:r>
-            <a:r>
-              <a:rPr lang="de-CH" sz="2800" dirty="0" smtClean="0">
-                <a:cs typeface="Courier New" pitchFamily="49" charset="0"/>
-              </a:rPr>
-              <a:t>(</a:t>
-            </a:r>
-            <a:r>
-              <a:rPr lang="de-CH" sz="2000" i="1" dirty="0" err="1" smtClean="0">
-                <a:latin typeface="Courier New" pitchFamily="49" charset="0"/>
-                <a:cs typeface="Courier New" pitchFamily="49" charset="0"/>
-              </a:rPr>
-              <a:t>System.out.println</a:t>
-            </a:r>
-            <a:r>
-              <a:rPr lang="de-CH" sz="2000" i="1" dirty="0" smtClean="0">
-                <a:latin typeface="Courier New" pitchFamily="49" charset="0"/>
-                <a:cs typeface="Courier New" pitchFamily="49" charset="0"/>
-              </a:rPr>
-              <a:t>(</a:t>
-            </a:r>
-            <a:r>
-              <a:rPr lang="de-CH" sz="2000" i="1" dirty="0" err="1" smtClean="0">
-                <a:latin typeface="Courier New" pitchFamily="49" charset="0"/>
-                <a:cs typeface="Courier New" pitchFamily="49" charset="0"/>
-              </a:rPr>
-              <a:t>colors</a:t>
-            </a:r>
-            <a:r>
-              <a:rPr lang="de-CH" sz="2000" i="1" dirty="0" smtClean="0">
-                <a:latin typeface="Courier New" pitchFamily="49" charset="0"/>
-                <a:cs typeface="Courier New" pitchFamily="49" charset="0"/>
-              </a:rPr>
-              <a:t>);</a:t>
-            </a:r>
-            <a:r>
-              <a:rPr lang="de-CH" sz="2800" dirty="0" smtClean="0">
-                <a:cs typeface="Courier New" pitchFamily="49" charset="0"/>
-              </a:rPr>
-              <a:t>)</a:t>
-            </a:r>
-            <a:r>
-              <a:rPr lang="de-CH" sz="2800" dirty="0" smtClean="0">
-                <a:latin typeface="Courier New" pitchFamily="49" charset="0"/>
-                <a:cs typeface="Courier New" pitchFamily="49" charset="0"/>
-              </a:rPr>
-              <a:t>:</a:t>
-            </a:r>
-          </a:p>
-          <a:p>
-            <a:pPr>
-              <a:buNone/>
-            </a:pPr>
-            <a:r>
-              <a:rPr lang="de-CH" sz="1600" dirty="0" smtClean="0">
-                <a:latin typeface="Courier New" pitchFamily="49" charset="0"/>
-                <a:cs typeface="Courier New" pitchFamily="49" charset="0"/>
-              </a:rPr>
-              <a:t>[</a:t>
-            </a:r>
-            <a:r>
-              <a:rPr lang="de-CH" sz="1600" dirty="0" err="1" smtClean="0">
-                <a:latin typeface="Courier New" pitchFamily="49" charset="0"/>
-                <a:cs typeface="Courier New" pitchFamily="49" charset="0"/>
-              </a:rPr>
-              <a:t>java.awt.Color</a:t>
-            </a:r>
-            <a:r>
-              <a:rPr lang="de-CH" sz="1600" dirty="0" smtClean="0">
-                <a:latin typeface="Courier New" pitchFamily="49" charset="0"/>
-                <a:cs typeface="Courier New" pitchFamily="49" charset="0"/>
-              </a:rPr>
-              <a:t>[r=255,g=0,b=0], </a:t>
-            </a:r>
-            <a:r>
-              <a:rPr lang="de-CH" sz="1600" dirty="0" err="1" smtClean="0">
-                <a:latin typeface="Courier New" pitchFamily="49" charset="0"/>
-                <a:cs typeface="Courier New" pitchFamily="49" charset="0"/>
-              </a:rPr>
-              <a:t>java.awt.Color</a:t>
-            </a:r>
-            <a:r>
-              <a:rPr lang="de-CH" sz="1600" dirty="0" smtClean="0">
-                <a:latin typeface="Courier New" pitchFamily="49" charset="0"/>
-                <a:cs typeface="Courier New" pitchFamily="49" charset="0"/>
-              </a:rPr>
-              <a:t>[r=0,g=0,b=255], </a:t>
-            </a:r>
-            <a:r>
-              <a:rPr lang="de-CH" sz="1600" dirty="0" err="1" smtClean="0">
-                <a:latin typeface="Courier New" pitchFamily="49" charset="0"/>
-                <a:cs typeface="Courier New" pitchFamily="49" charset="0"/>
-              </a:rPr>
-              <a:t>java.awt.Color</a:t>
-            </a:r>
-            <a:r>
-              <a:rPr lang="de-CH" sz="1600" dirty="0" smtClean="0">
-                <a:latin typeface="Courier New" pitchFamily="49" charset="0"/>
-                <a:cs typeface="Courier New" pitchFamily="49" charset="0"/>
-              </a:rPr>
-              <a:t>[r=128,g=128,b=128], </a:t>
-            </a:r>
-            <a:r>
-              <a:rPr lang="de-CH" sz="1600" dirty="0" err="1" smtClean="0">
-                <a:latin typeface="Courier New" pitchFamily="49" charset="0"/>
-                <a:cs typeface="Courier New" pitchFamily="49" charset="0"/>
-              </a:rPr>
-              <a:t>java.awt.Color</a:t>
-            </a:r>
-            <a:r>
-              <a:rPr lang="de-CH" sz="1600" dirty="0" smtClean="0">
-                <a:latin typeface="Courier New" pitchFamily="49" charset="0"/>
-                <a:cs typeface="Courier New" pitchFamily="49" charset="0"/>
-              </a:rPr>
-              <a:t>[r=0,g=255,b=0], </a:t>
-            </a:r>
-            <a:r>
-              <a:rPr lang="de-CH" sz="1600" dirty="0" err="1" smtClean="0">
-                <a:latin typeface="Courier New" pitchFamily="49" charset="0"/>
-                <a:cs typeface="Courier New" pitchFamily="49" charset="0"/>
-              </a:rPr>
-              <a:t>java.awt.Color</a:t>
-            </a:r>
-            <a:r>
-              <a:rPr lang="de-CH" sz="1600" dirty="0" smtClean="0">
-                <a:latin typeface="Courier New" pitchFamily="49" charset="0"/>
-                <a:cs typeface="Courier New" pitchFamily="49" charset="0"/>
-              </a:rPr>
-              <a:t>[r=255,g=255,b=0], </a:t>
-            </a:r>
-            <a:r>
-              <a:rPr lang="de-CH" sz="1600" dirty="0" err="1" smtClean="0">
-                <a:latin typeface="Courier New" pitchFamily="49" charset="0"/>
-                <a:cs typeface="Courier New" pitchFamily="49" charset="0"/>
-              </a:rPr>
-              <a:t>java.awt.Color</a:t>
-            </a:r>
-            <a:r>
-              <a:rPr lang="de-CH" sz="1600" dirty="0" smtClean="0">
-                <a:latin typeface="Courier New" pitchFamily="49" charset="0"/>
-                <a:cs typeface="Courier New" pitchFamily="49" charset="0"/>
-              </a:rPr>
-              <a:t>[r=0,g=0,b=255]]</a:t>
-            </a:r>
-            <a:endParaRPr lang="de-CH" sz="2800" dirty="0" smtClean="0">
-              <a:latin typeface="Courier New" pitchFamily="49" charset="0"/>
-              <a:cs typeface="Courier New" pitchFamily="49" charset="0"/>
-            </a:endParaRPr>
-          </a:p>
-          <a:p>
-            <a:pPr>
-              <a:buNone/>
-            </a:pPr>
-            <a:endParaRPr lang="de-CH" sz="1200" dirty="0" smtClean="0">
-              <a:cs typeface="Courier New" pitchFamily="49" charset="0"/>
-            </a:endParaRPr>
-          </a:p>
-          <a:p>
-            <a:pPr>
-              <a:buNone/>
-            </a:pPr>
-            <a:r>
-              <a:rPr lang="de-CH" sz="2800" dirty="0" err="1" smtClean="0">
-                <a:cs typeface="Courier New" pitchFamily="49" charset="0"/>
-              </a:rPr>
-              <a:t>Possible</a:t>
-            </a:r>
-            <a:r>
-              <a:rPr lang="de-CH" sz="2800" dirty="0" smtClean="0">
-                <a:cs typeface="Courier New" pitchFamily="49" charset="0"/>
-              </a:rPr>
-              <a:t> </a:t>
-            </a:r>
-            <a:r>
-              <a:rPr lang="de-CH" sz="2800" dirty="0" err="1" smtClean="0">
-                <a:cs typeface="Courier New" pitchFamily="49" charset="0"/>
-              </a:rPr>
-              <a:t>graphical</a:t>
-            </a:r>
-            <a:r>
-              <a:rPr lang="de-CH" sz="2800" dirty="0" smtClean="0">
-                <a:cs typeface="Courier New" pitchFamily="49" charset="0"/>
-              </a:rPr>
-              <a:t> </a:t>
-            </a:r>
-            <a:r>
-              <a:rPr lang="de-CH" sz="2800" dirty="0" err="1" smtClean="0">
-                <a:cs typeface="Courier New" pitchFamily="49" charset="0"/>
-              </a:rPr>
-              <a:t>output</a:t>
-            </a:r>
-            <a:r>
-              <a:rPr lang="de-CH" sz="2800" dirty="0" smtClean="0">
-                <a:cs typeface="Courier New" pitchFamily="49" charset="0"/>
-              </a:rPr>
-              <a:t> (</a:t>
-            </a:r>
-            <a:r>
-              <a:rPr lang="de-CH" sz="2000" i="1" dirty="0" smtClean="0">
-                <a:latin typeface="Courier New" pitchFamily="49" charset="0"/>
-                <a:cs typeface="Courier New" pitchFamily="49" charset="0"/>
-              </a:rPr>
-              <a:t>D.raw(</a:t>
-            </a:r>
-            <a:r>
-              <a:rPr lang="de-CH" sz="2000" i="1" dirty="0" err="1" smtClean="0">
-                <a:latin typeface="Courier New" pitchFamily="49" charset="0"/>
-                <a:cs typeface="Courier New" pitchFamily="49" charset="0"/>
-              </a:rPr>
-              <a:t>colors</a:t>
-            </a:r>
-            <a:r>
-              <a:rPr lang="de-CH" sz="2000" i="1" dirty="0" smtClean="0">
-                <a:latin typeface="Courier New" pitchFamily="49" charset="0"/>
-                <a:cs typeface="Courier New" pitchFamily="49" charset="0"/>
-              </a:rPr>
-              <a:t>);</a:t>
-            </a:r>
-            <a:r>
-              <a:rPr lang="de-CH" sz="2800" dirty="0" smtClean="0">
-                <a:cs typeface="Courier New" pitchFamily="49" charset="0"/>
-              </a:rPr>
-              <a:t>):</a:t>
-            </a:r>
-          </a:p>
-          <a:p>
-            <a:pPr>
-              <a:buNone/>
-            </a:pPr>
-            <a:endParaRPr lang="de-CH" sz="2800" dirty="0">
-              <a:cs typeface="Courier New" pitchFamily="49" charset="0"/>
-            </a:endParaRPr>
-          </a:p>
-        </p:txBody>
-      </p:sp>
-      <p:pic>
-        <p:nvPicPr>
-          <p:cNvPr id="1026" name="Picture 2" descr="C:\Users\Reichenbach Cedric\Dropbox\studium\ba\pics presentation\skizze visualization al colors Kopie.jpg"/>
-          <p:cNvPicPr>
-            <a:picLocks noChangeAspect="1" noChangeArrowheads="1"/>
-          </p:cNvPicPr>
-          <p:nvPr/>
-        </p:nvPicPr>
-        <p:blipFill>
-          <a:blip r:embed="rId2" cstate="print"/>
-          <a:srcRect l="5046" t="20236" r="15746" b="54849"/>
-          <a:stretch>
-            <a:fillRect/>
-          </a:stretch>
-        </p:blipFill>
-        <p:spPr bwMode="auto">
-          <a:xfrm>
-            <a:off x="395536" y="4293096"/>
-            <a:ext cx="8424936" cy="1656184"/>
-          </a:xfrm>
-          <a:prstGeom prst="rect">
-            <a:avLst/>
-          </a:prstGeom>
-          <a:noFill/>
-        </p:spPr>
-      </p:pic>
+              <a:rPr lang="de-CH" dirty="0" err="1" smtClean="0"/>
+              <a:t>toString</a:t>
+            </a:r>
+            <a:r>
+              <a:rPr lang="de-CH" dirty="0" smtClean="0"/>
+              <a:t>()</a:t>
+            </a:r>
+            <a:endParaRPr lang="de-CH" dirty="0"/>
+          </a:p>
+        </p:txBody>
+      </p:sp>
     </p:spTree>
     <p:extLst>
       <p:ext uri="{BB962C8B-B14F-4D97-AF65-F5344CB8AC3E}">
-        <p14:creationId xmlns:p14="http://schemas.microsoft.com/office/powerpoint/2010/main" val="2959050202"/>
-      </p:ext>
-    </p:extLst>
-  </p:cSld>
-  <p:clrMapOvr>
-    <a:masterClrMapping/>
-  </p:clrMapOvr>
-  <p:timing>
-    <p:tnLst>
-      <p:par>
-        <p:cTn id="1" dur="indefinite" restart="never" nodeType="tmRoot">
-          <p:childTnLst>
-            <p:seq concurrent="1" nextAc="seek">
-              <p:cTn id="2" dur="indefinite" nodeType="mainSeq">
-                <p:childTnLst>
-                  <p:par>
-                    <p:cTn id="3" fill="hold">
-                      <p:stCondLst>
-                        <p:cond delay="indefinite"/>
-                      </p:stCondLst>
-                      <p:childTnLst>
-                        <p:par>
-                          <p:cTn id="4" fill="hold">
-                            <p:stCondLst>
-                              <p:cond delay="0"/>
-                            </p:stCondLst>
-                            <p:childTnLst>
-                              <p:par>
-                                <p:cTn id="5" presetID="1" presetClass="entr" presetSubtype="0" fill="hold" grpId="0" nodeType="clickEffect">
-                                  <p:stCondLst>
-                                    <p:cond delay="0"/>
-                                  </p:stCondLst>
-                                  <p:childTnLst>
-                                    <p:set>
-                                      <p:cBhvr>
-                                        <p:cTn id="6" dur="1" fill="hold">
-                                          <p:stCondLst>
-                                            <p:cond delay="0"/>
-                                          </p:stCondLst>
-                                        </p:cTn>
-                                        <p:tgtEl>
-                                          <p:spTgt spid="3">
-                                            <p:txEl>
-                                              <p:pRg st="0" end="0"/>
-                                            </p:txEl>
-                                          </p:spTgt>
-                                        </p:tgtEl>
-                                        <p:attrNameLst>
-                                          <p:attrName>style.visibility</p:attrName>
-                                        </p:attrNameLst>
-                                      </p:cBhvr>
-                                      <p:to>
-                                        <p:strVal val="visible"/>
-                                      </p:to>
-                                    </p:set>
-                                  </p:childTnLst>
-                                </p:cTn>
-                              </p:par>
-                            </p:childTnLst>
-                          </p:cTn>
-                        </p:par>
-                      </p:childTnLst>
-                    </p:cTn>
-                  </p:par>
-                  <p:par>
-                    <p:cTn id="7" fill="hold">
-                      <p:stCondLst>
-                        <p:cond delay="indefinite"/>
-                      </p:stCondLst>
-                      <p:childTnLst>
-                        <p:par>
-                          <p:cTn id="8" fill="hold">
-                            <p:stCondLst>
-                              <p:cond delay="0"/>
-                            </p:stCondLst>
-                            <p:childTnLst>
-                              <p:par>
-                                <p:cTn id="9" presetID="1" presetClass="entr" presetSubtype="0" fill="hold" grpId="0" nodeType="clickEffect">
-                                  <p:stCondLst>
-                                    <p:cond delay="0"/>
-                                  </p:stCondLst>
-                                  <p:childTnLst>
-                                    <p:set>
-                                      <p:cBhvr>
-                                        <p:cTn id="10" dur="1" fill="hold">
-                                          <p:stCondLst>
-                                            <p:cond delay="0"/>
-                                          </p:stCondLst>
-                                        </p:cTn>
-                                        <p:tgtEl>
-                                          <p:spTgt spid="3">
-                                            <p:txEl>
-                                              <p:pRg st="2" end="2"/>
-                                            </p:txEl>
-                                          </p:spTgt>
-                                        </p:tgtEl>
-                                        <p:attrNameLst>
-                                          <p:attrName>style.visibility</p:attrName>
-                                        </p:attrNameLst>
-                                      </p:cBhvr>
-                                      <p:to>
-                                        <p:strVal val="visible"/>
-                                      </p:to>
-                                    </p:set>
-                                  </p:childTnLst>
-                                </p:cTn>
-                              </p:par>
-                            </p:childTnLst>
-                          </p:cTn>
-                        </p:par>
-                      </p:childTnLst>
-                    </p:cTn>
-                  </p:par>
-                  <p:par>
-                    <p:cTn id="11" fill="hold">
-                      <p:stCondLst>
-                        <p:cond delay="indefinite"/>
-                      </p:stCondLst>
-                      <p:childTnLst>
-                        <p:par>
-                          <p:cTn id="12" fill="hold">
-                            <p:stCondLst>
-                              <p:cond delay="0"/>
-                            </p:stCondLst>
-                            <p:childTnLst>
-                              <p:par>
-                                <p:cTn id="13" presetID="1" presetClass="entr" presetSubtype="0" fill="hold" grpId="0" nodeType="clickEffect">
-                                  <p:stCondLst>
-                                    <p:cond delay="0"/>
-                                  </p:stCondLst>
-                                  <p:childTnLst>
-                                    <p:set>
-                                      <p:cBhvr>
-                                        <p:cTn id="14" dur="1" fill="hold">
-                                          <p:stCondLst>
-                                            <p:cond delay="0"/>
-                                          </p:stCondLst>
-                                        </p:cTn>
-                                        <p:tgtEl>
-                                          <p:spTgt spid="3">
-                                            <p:txEl>
-                                              <p:pRg st="3" end="3"/>
-                                            </p:txEl>
-                                          </p:spTgt>
-                                        </p:tgtEl>
-                                        <p:attrNameLst>
-                                          <p:attrName>style.visibility</p:attrName>
-                                        </p:attrNameLst>
-                                      </p:cBhvr>
-                                      <p:to>
-                                        <p:strVal val="visible"/>
-                                      </p:to>
-                                    </p:set>
-                                  </p:childTnLst>
-                                </p:cTn>
-                              </p:par>
-                            </p:childTnLst>
-                          </p:cTn>
-                        </p:par>
-                      </p:childTnLst>
-                    </p:cTn>
-                  </p:par>
-                  <p:par>
-                    <p:cTn id="15" fill="hold">
-                      <p:stCondLst>
-                        <p:cond delay="indefinite"/>
-                      </p:stCondLst>
-                      <p:childTnLst>
-                        <p:par>
-                          <p:cTn id="16" fill="hold">
-                            <p:stCondLst>
-                              <p:cond delay="0"/>
-                            </p:stCondLst>
-                            <p:childTnLst>
-                              <p:par>
-                                <p:cTn id="17" presetID="1" presetClass="entr" presetSubtype="0" fill="hold" grpId="0" nodeType="clickEffect">
-                                  <p:stCondLst>
-                                    <p:cond delay="0"/>
-                                  </p:stCondLst>
-                                  <p:childTnLst>
-                                    <p:set>
-                                      <p:cBhvr>
-                                        <p:cTn id="18" dur="1" fill="hold">
-                                          <p:stCondLst>
-                                            <p:cond delay="0"/>
-                                          </p:stCondLst>
-                                        </p:cTn>
-                                        <p:tgtEl>
-                                          <p:spTgt spid="3">
-                                            <p:txEl>
-                                              <p:pRg st="5" end="5"/>
-                                            </p:txEl>
-                                          </p:spTgt>
-                                        </p:tgtEl>
-                                        <p:attrNameLst>
-                                          <p:attrName>style.visibility</p:attrName>
-                                        </p:attrNameLst>
-                                      </p:cBhvr>
-                                      <p:to>
-                                        <p:strVal val="visible"/>
-                                      </p:to>
-                                    </p:set>
-                                  </p:childTnLst>
-                                </p:cTn>
-                              </p:par>
-                            </p:childTnLst>
-                          </p:cTn>
-                        </p:par>
-                      </p:childTnLst>
-                    </p:cTn>
-                  </p:par>
-                  <p:par>
-                    <p:cTn id="19" fill="hold">
-                      <p:stCondLst>
-                        <p:cond delay="indefinite"/>
-                      </p:stCondLst>
-                      <p:childTnLst>
-                        <p:par>
-                          <p:cTn id="20" fill="hold">
-                            <p:stCondLst>
-                              <p:cond delay="0"/>
-                            </p:stCondLst>
-                            <p:childTnLst>
-                              <p:par>
-                                <p:cTn id="21" presetID="1" presetClass="entr" presetSubtype="0" fill="hold" nodeType="clickEffect">
-                                  <p:stCondLst>
-                                    <p:cond delay="0"/>
-                                  </p:stCondLst>
-                                  <p:childTnLst>
-                                    <p:set>
-                                      <p:cBhvr>
-                                        <p:cTn id="22" dur="1" fill="hold">
-                                          <p:stCondLst>
-                                            <p:cond delay="0"/>
-                                          </p:stCondLst>
-                                        </p:cTn>
-                                        <p:tgtEl>
-                                          <p:spTgt spid="1026"/>
-                                        </p:tgtEl>
-                                        <p:attrNameLst>
-                                          <p:attrName>style.visibility</p:attrName>
-                                        </p:attrNameLst>
-                                      </p:cBhvr>
-                                      <p:to>
-                                        <p:strVal val="visible"/>
-                                      </p:to>
-                                    </p:set>
-                                  </p:childTnLst>
-                                </p:cTn>
-                              </p:par>
-                            </p:childTnLst>
-                          </p:cTn>
-                        </p:par>
-                      </p:childTnLst>
-                    </p:cTn>
-                  </p:par>
-                </p:childTnLst>
-              </p:cTn>
-              <p:prevCondLst>
-                <p:cond evt="onPrev" delay="0">
-                  <p:tgtEl>
-                    <p:sldTgt/>
-                  </p:tgtEl>
-                </p:cond>
-              </p:prevCondLst>
-              <p:nextCondLst>
-                <p:cond evt="onNext" delay="0">
-                  <p:tgtEl>
-                    <p:sldTgt/>
-                  </p:tgtEl>
-                </p:cond>
-              </p:nextCondLst>
-            </p:seq>
-          </p:childTnLst>
-        </p:cTn>
-      </p:par>
-    </p:tnLst>
-    <p:bldLst>
-      <p:bldP spid="3" grpId="0" build="p"/>
-    </p:bldLst>
-  </p:timing>
-</p:sld>
-</file>
-
-<file path=ppt/slides/slide3.xml><?xml version="1.0" encoding="utf-8"?>
-<p:sld xmlns:a="http://schemas.openxmlformats.org/drawingml/2006/main" xmlns:r="http://schemas.openxmlformats.org/officeDocument/2006/relationships" xmlns:p="http://schemas.openxmlformats.org/presentationml/2006/main">
-  <p:cSld>
-    <p:spTree>
-      <p:nvGrpSpPr>
-        <p:cNvPr id="1" name=""/>
-        <p:cNvGrpSpPr/>
-        <p:nvPr/>
-      </p:nvGrpSpPr>
-      <p:grpSpPr>
-        <a:xfrm>
-          <a:off x="0" y="0"/>
-          <a:ext cx="0" cy="0"/>
-          <a:chOff x="0" y="0"/>
-          <a:chExt cx="0" cy="0"/>
-        </a:xfrm>
-      </p:grpSpPr>
-      <p:sp>
-        <p:nvSpPr>
-          <p:cNvPr id="2" name="Titel 1"/>
-          <p:cNvSpPr>
-            <a:spLocks noGrp="1"/>
-          </p:cNvSpPr>
-          <p:nvPr>
-            <p:ph type="title"/>
-          </p:nvPr>
-        </p:nvSpPr>
-        <p:spPr/>
-        <p:txBody>
-          <a:bodyPr/>
-          <a:lstStyle/>
-          <a:p>
-            <a:r>
-              <a:rPr lang="de-CH" dirty="0" err="1" smtClean="0"/>
-              <a:t>Use</a:t>
-            </a:r>
-            <a:r>
-              <a:rPr lang="de-CH" dirty="0" smtClean="0"/>
-              <a:t> </a:t>
-            </a:r>
-            <a:r>
-              <a:rPr lang="de-CH" dirty="0"/>
-              <a:t>C</a:t>
-            </a:r>
-            <a:r>
-              <a:rPr lang="de-CH" dirty="0" smtClean="0"/>
-              <a:t>ase</a:t>
-            </a:r>
-            <a:endParaRPr lang="de-CH" dirty="0"/>
-          </a:p>
-        </p:txBody>
-      </p:sp>
-      <p:sp>
-        <p:nvSpPr>
-          <p:cNvPr id="3" name="Inhaltsplatzhalter 2"/>
-          <p:cNvSpPr>
-            <a:spLocks noGrp="1"/>
-          </p:cNvSpPr>
-          <p:nvPr>
-            <p:ph idx="1"/>
-          </p:nvPr>
-        </p:nvSpPr>
-        <p:spPr/>
-        <p:txBody>
-          <a:bodyPr/>
-          <a:lstStyle/>
-          <a:p>
-            <a:pPr marL="0" indent="0">
-              <a:buNone/>
-            </a:pPr>
-            <a:r>
-              <a:rPr lang="de-CH" dirty="0" err="1" smtClean="0"/>
-              <a:t>ArrayList</a:t>
-            </a:r>
-            <a:r>
-              <a:rPr lang="de-CH" dirty="0" smtClean="0"/>
-              <a:t>&lt;Person&gt; </a:t>
-            </a:r>
-            <a:r>
-              <a:rPr lang="de-CH" dirty="0" err="1" smtClean="0">
-                <a:solidFill>
-                  <a:schemeClr val="accent1"/>
-                </a:solidFill>
-              </a:rPr>
-              <a:t>persons</a:t>
-            </a:r>
-            <a:endParaRPr lang="de-CH" dirty="0" smtClean="0">
-              <a:solidFill>
-                <a:schemeClr val="accent1"/>
-              </a:solidFill>
-            </a:endParaRPr>
-          </a:p>
-          <a:p>
-            <a:pPr marL="0" indent="0">
-              <a:buNone/>
-            </a:pPr>
-            <a:endParaRPr lang="de-CH" b="1" dirty="0"/>
-          </a:p>
-          <a:p>
-            <a:pPr marL="0" indent="0">
-              <a:buNone/>
-            </a:pPr>
-            <a:r>
-              <a:rPr lang="de-CH" b="1" dirty="0" smtClean="0"/>
-              <a:t>Person</a:t>
-            </a:r>
-            <a:r>
-              <a:rPr lang="de-CH" dirty="0" smtClean="0"/>
-              <a:t> </a:t>
-            </a:r>
-            <a:r>
-              <a:rPr lang="de-CH" dirty="0" err="1" smtClean="0"/>
-              <a:t>class</a:t>
-            </a:r>
-            <a:r>
-              <a:rPr lang="de-CH" dirty="0" smtClean="0"/>
-              <a:t> </a:t>
-            </a:r>
-            <a:r>
-              <a:rPr lang="de-CH" dirty="0" err="1" smtClean="0"/>
-              <a:t>fields</a:t>
-            </a:r>
-            <a:r>
-              <a:rPr lang="de-CH" dirty="0" smtClean="0"/>
-              <a:t>:</a:t>
-            </a:r>
-          </a:p>
-          <a:p>
-            <a:r>
-              <a:rPr lang="de-CH" dirty="0" smtClean="0"/>
-              <a:t>String </a:t>
-            </a:r>
-            <a:r>
-              <a:rPr lang="de-CH" dirty="0" err="1" smtClean="0">
-                <a:solidFill>
-                  <a:schemeClr val="accent1"/>
-                </a:solidFill>
-              </a:rPr>
-              <a:t>name</a:t>
-            </a:r>
-            <a:endParaRPr lang="de-CH" dirty="0" smtClean="0">
-              <a:solidFill>
-                <a:schemeClr val="accent1"/>
-              </a:solidFill>
-            </a:endParaRPr>
-          </a:p>
-          <a:p>
-            <a:r>
-              <a:rPr lang="de-CH" dirty="0" err="1" smtClean="0"/>
-              <a:t>PhoneNumber</a:t>
-            </a:r>
-            <a:r>
-              <a:rPr lang="de-CH" dirty="0" smtClean="0"/>
-              <a:t> </a:t>
-            </a:r>
-            <a:r>
-              <a:rPr lang="de-CH" dirty="0" err="1" smtClean="0">
-                <a:solidFill>
-                  <a:schemeClr val="accent1"/>
-                </a:solidFill>
-              </a:rPr>
-              <a:t>number</a:t>
-            </a:r>
-            <a:r>
-              <a:rPr lang="de-CH" dirty="0">
-                <a:solidFill>
-                  <a:schemeClr val="accent1"/>
-                </a:solidFill>
-              </a:rPr>
-              <a:t> </a:t>
-            </a:r>
-            <a:r>
-              <a:rPr lang="de-CH" i="1" dirty="0" smtClean="0"/>
-              <a:t>(</a:t>
-            </a:r>
-            <a:r>
-              <a:rPr lang="de-CH" i="1" dirty="0" err="1" smtClean="0"/>
-              <a:t>foreign</a:t>
-            </a:r>
-            <a:r>
-              <a:rPr lang="de-CH" i="1" dirty="0" smtClean="0"/>
-              <a:t> </a:t>
-            </a:r>
-            <a:r>
-              <a:rPr lang="de-CH" i="1" dirty="0" err="1" smtClean="0"/>
-              <a:t>class</a:t>
-            </a:r>
-            <a:r>
-              <a:rPr lang="de-CH" i="1" dirty="0" smtClean="0"/>
-              <a:t>)</a:t>
-            </a:r>
-            <a:endParaRPr lang="de-CH" dirty="0" smtClean="0">
-              <a:solidFill>
-                <a:schemeClr val="accent1"/>
-              </a:solidFill>
-            </a:endParaRPr>
-          </a:p>
-          <a:p>
-            <a:r>
-              <a:rPr lang="de-CH" dirty="0" err="1"/>
-              <a:t>b</a:t>
-            </a:r>
-            <a:r>
-              <a:rPr lang="de-CH" dirty="0" err="1" smtClean="0"/>
-              <a:t>yte</a:t>
-            </a:r>
-            <a:r>
-              <a:rPr lang="de-CH" dirty="0" smtClean="0"/>
-              <a:t>[] </a:t>
-            </a:r>
-            <a:r>
-              <a:rPr lang="de-CH" dirty="0" err="1" smtClean="0">
-                <a:solidFill>
-                  <a:schemeClr val="accent1"/>
-                </a:solidFill>
-              </a:rPr>
-              <a:t>image</a:t>
-            </a:r>
-            <a:r>
-              <a:rPr lang="de-CH" dirty="0" smtClean="0">
-                <a:solidFill>
-                  <a:schemeClr val="accent1"/>
-                </a:solidFill>
-              </a:rPr>
-              <a:t> </a:t>
-            </a:r>
-            <a:r>
-              <a:rPr lang="de-CH" i="1" dirty="0" smtClean="0"/>
-              <a:t>(</a:t>
-            </a:r>
-            <a:r>
-              <a:rPr lang="de-CH" i="1" dirty="0" err="1" smtClean="0"/>
-              <a:t>from</a:t>
-            </a:r>
-            <a:r>
-              <a:rPr lang="de-CH" i="1" dirty="0" smtClean="0"/>
-              <a:t> .</a:t>
-            </a:r>
-            <a:r>
-              <a:rPr lang="de-CH" i="1" dirty="0" err="1" smtClean="0"/>
-              <a:t>png</a:t>
-            </a:r>
-            <a:r>
-              <a:rPr lang="de-CH" i="1" dirty="0" smtClean="0"/>
-              <a:t>-file)</a:t>
-            </a:r>
-            <a:endParaRPr lang="de-CH" dirty="0">
-              <a:solidFill>
-                <a:schemeClr val="accent1"/>
-              </a:solidFill>
-            </a:endParaRPr>
-          </a:p>
-        </p:txBody>
-      </p:sp>
-    </p:spTree>
-    <p:extLst>
-      <p:ext uri="{BB962C8B-B14F-4D97-AF65-F5344CB8AC3E}">
-        <p14:creationId xmlns:p14="http://schemas.microsoft.com/office/powerpoint/2010/main" val="1866993003"/>
-      </p:ext>
-    </p:extLst>
-  </p:cSld>
-  <p:clrMapOvr>
-    <a:masterClrMapping/>
-  </p:clrMapOvr>
-  <p:timing>
-    <p:tnLst>
-      <p:par>
-        <p:cTn id="1" dur="indefinite" restart="never" nodeType="tmRoot"/>
-      </p:par>
-    </p:tnLst>
-  </p:timing>
-</p:sld>
-</file>
-
-<file path=ppt/slides/slide4.xml><?xml version="1.0" encoding="utf-8"?>
-<p:sld xmlns:a="http://schemas.openxmlformats.org/drawingml/2006/main" xmlns:r="http://schemas.openxmlformats.org/officeDocument/2006/relationships" xmlns:p="http://schemas.openxmlformats.org/presentationml/2006/main">
-  <p:cSld>
-    <p:spTree>
-      <p:nvGrpSpPr>
-        <p:cNvPr id="1" name=""/>
-        <p:cNvGrpSpPr/>
-        <p:nvPr/>
-      </p:nvGrpSpPr>
-      <p:grpSpPr>
-        <a:xfrm>
-          <a:off x="0" y="0"/>
-          <a:ext cx="0" cy="0"/>
-          <a:chOff x="0" y="0"/>
-          <a:chExt cx="0" cy="0"/>
-        </a:xfrm>
-      </p:grpSpPr>
-      <p:sp>
-        <p:nvSpPr>
-          <p:cNvPr id="2" name="Titel 1"/>
-          <p:cNvSpPr>
-            <a:spLocks noGrp="1"/>
-          </p:cNvSpPr>
-          <p:nvPr>
-            <p:ph type="title"/>
-          </p:nvPr>
-        </p:nvSpPr>
-        <p:spPr/>
-        <p:txBody>
-          <a:bodyPr/>
-          <a:lstStyle/>
-          <a:p>
-            <a:r>
-              <a:rPr lang="de-CH" dirty="0" err="1" smtClean="0"/>
-              <a:t>Use</a:t>
-            </a:r>
-            <a:r>
-              <a:rPr lang="de-CH" dirty="0" smtClean="0"/>
-              <a:t> Case</a:t>
-            </a:r>
-            <a:endParaRPr lang="de-CH" dirty="0"/>
-          </a:p>
-        </p:txBody>
-      </p:sp>
-      <p:sp>
-        <p:nvSpPr>
-          <p:cNvPr id="3" name="Inhaltsplatzhalter 2"/>
-          <p:cNvSpPr>
-            <a:spLocks noGrp="1"/>
-          </p:cNvSpPr>
-          <p:nvPr>
-            <p:ph idx="1"/>
-          </p:nvPr>
-        </p:nvSpPr>
-        <p:spPr/>
-        <p:txBody>
-          <a:bodyPr/>
-          <a:lstStyle/>
-          <a:p>
-            <a:pPr marL="0" indent="0">
-              <a:buNone/>
-            </a:pPr>
-            <a:r>
-              <a:rPr lang="de-CH" i="1" dirty="0" err="1" smtClean="0"/>
-              <a:t>System.out.println</a:t>
-            </a:r>
-            <a:r>
-              <a:rPr lang="de-CH" i="1" dirty="0" smtClean="0"/>
-              <a:t>(</a:t>
-            </a:r>
-            <a:r>
-              <a:rPr lang="de-CH" i="1" dirty="0" err="1" smtClean="0"/>
-              <a:t>persons</a:t>
-            </a:r>
-            <a:r>
-              <a:rPr lang="de-CH" i="1" dirty="0" smtClean="0"/>
-              <a:t>);</a:t>
-            </a:r>
-          </a:p>
-          <a:p>
-            <a:pPr marL="0" indent="0">
-              <a:buNone/>
-            </a:pPr>
-            <a:r>
-              <a:rPr lang="de-CH" i="1" dirty="0">
-                <a:sym typeface="Wingdings" pitchFamily="2" charset="2"/>
-              </a:rPr>
-              <a:t>	</a:t>
-            </a:r>
-            <a:r>
-              <a:rPr lang="de-CH" dirty="0" smtClean="0">
-                <a:sym typeface="Wingdings" pitchFamily="2" charset="2"/>
-              </a:rPr>
-              <a:t> 		(</a:t>
-            </a:r>
-            <a:r>
-              <a:rPr lang="de-CH" dirty="0" err="1" smtClean="0">
-                <a:sym typeface="Wingdings" pitchFamily="2" charset="2"/>
-              </a:rPr>
-              <a:t>too</a:t>
-            </a:r>
-            <a:r>
-              <a:rPr lang="de-CH" dirty="0" smtClean="0">
-                <a:sym typeface="Wingdings" pitchFamily="2" charset="2"/>
-              </a:rPr>
-              <a:t> </a:t>
-            </a:r>
-            <a:r>
-              <a:rPr lang="de-CH" dirty="0" err="1" smtClean="0">
-                <a:sym typeface="Wingdings" pitchFamily="2" charset="2"/>
-              </a:rPr>
-              <a:t>much</a:t>
-            </a:r>
-            <a:r>
-              <a:rPr lang="de-CH" dirty="0">
-                <a:sym typeface="Wingdings" pitchFamily="2" charset="2"/>
-              </a:rPr>
-              <a:t> </a:t>
-            </a:r>
-            <a:r>
-              <a:rPr lang="de-CH" dirty="0" err="1" smtClean="0">
-                <a:sym typeface="Wingdings" pitchFamily="2" charset="2"/>
-              </a:rPr>
-              <a:t>confusing</a:t>
-            </a:r>
-            <a:r>
-              <a:rPr lang="de-CH" dirty="0" smtClean="0">
-                <a:sym typeface="Wingdings" pitchFamily="2" charset="2"/>
-              </a:rPr>
-              <a:t> </a:t>
-            </a:r>
-            <a:r>
-              <a:rPr lang="de-CH" dirty="0" err="1" smtClean="0">
-                <a:sym typeface="Wingdings" pitchFamily="2" charset="2"/>
-              </a:rPr>
-              <a:t>text</a:t>
-            </a:r>
-            <a:r>
-              <a:rPr lang="de-CH" dirty="0" smtClean="0">
-                <a:sym typeface="Wingdings" pitchFamily="2" charset="2"/>
-              </a:rPr>
-              <a:t>)</a:t>
-            </a:r>
-          </a:p>
-          <a:p>
-            <a:pPr marL="0" indent="0">
-              <a:buNone/>
-            </a:pPr>
-            <a:endParaRPr lang="de-CH" i="1" dirty="0" smtClean="0">
-              <a:sym typeface="Wingdings" pitchFamily="2" charset="2"/>
-            </a:endParaRPr>
-          </a:p>
-          <a:p>
-            <a:pPr marL="0" indent="0">
-              <a:buNone/>
-            </a:pPr>
-            <a:endParaRPr lang="de-CH" i="1" dirty="0">
-              <a:sym typeface="Wingdings" pitchFamily="2" charset="2"/>
-            </a:endParaRPr>
-          </a:p>
-          <a:p>
-            <a:pPr marL="0" indent="0">
-              <a:buNone/>
-            </a:pPr>
-            <a:r>
-              <a:rPr lang="de-CH" dirty="0" err="1" smtClean="0">
-                <a:sym typeface="Wingdings" pitchFamily="2" charset="2"/>
-              </a:rPr>
-              <a:t>Let’s</a:t>
-            </a:r>
-            <a:r>
-              <a:rPr lang="de-CH" dirty="0" smtClean="0">
-                <a:sym typeface="Wingdings" pitchFamily="2" charset="2"/>
-              </a:rPr>
-              <a:t> </a:t>
-            </a:r>
-            <a:r>
-              <a:rPr lang="de-CH" dirty="0" err="1" smtClean="0">
-                <a:sym typeface="Wingdings" pitchFamily="2" charset="2"/>
-              </a:rPr>
-              <a:t>define</a:t>
-            </a:r>
-            <a:r>
-              <a:rPr lang="de-CH" dirty="0" smtClean="0">
-                <a:sym typeface="Wingdings" pitchFamily="2" charset="2"/>
-              </a:rPr>
-              <a:t> a </a:t>
-            </a:r>
-            <a:r>
-              <a:rPr lang="de-CH" dirty="0" err="1" smtClean="0">
-                <a:sym typeface="Wingdings" pitchFamily="2" charset="2"/>
-              </a:rPr>
-              <a:t>drawOn</a:t>
-            </a:r>
-            <a:r>
-              <a:rPr lang="de-CH" dirty="0" smtClean="0">
-                <a:sym typeface="Wingdings" pitchFamily="2" charset="2"/>
-              </a:rPr>
-              <a:t>()-</a:t>
-            </a:r>
-            <a:r>
-              <a:rPr lang="de-CH" dirty="0" err="1" smtClean="0">
-                <a:sym typeface="Wingdings" pitchFamily="2" charset="2"/>
-              </a:rPr>
-              <a:t>method</a:t>
-            </a:r>
-            <a:r>
-              <a:rPr lang="de-CH" dirty="0" smtClean="0">
-                <a:sym typeface="Wingdings" pitchFamily="2" charset="2"/>
-              </a:rPr>
-              <a:t>!</a:t>
-            </a:r>
-            <a:endParaRPr lang="de-CH" dirty="0"/>
-          </a:p>
-        </p:txBody>
-      </p:sp>
-      <p:sp>
-        <p:nvSpPr>
-          <p:cNvPr id="4" name="Smiley 3"/>
-          <p:cNvSpPr/>
-          <p:nvPr/>
-        </p:nvSpPr>
-        <p:spPr>
-          <a:xfrm>
-            <a:off x="2195736" y="2171319"/>
-            <a:ext cx="792088" cy="693077"/>
-          </a:xfrm>
-          <a:prstGeom prst="smileyFace">
-            <a:avLst>
-              <a:gd name="adj" fmla="val -4653"/>
-            </a:avLst>
-          </a:prstGeom>
-          <a:solidFill>
-            <a:srgbClr val="FFFF00"/>
-          </a:solidFill>
-          <a:ln>
-            <a:solidFill>
-              <a:schemeClr val="tx1"/>
-            </a:solidFill>
-          </a:ln>
-        </p:spPr>
-        <p:style>
-          <a:lnRef idx="2">
-            <a:schemeClr val="accent6"/>
-          </a:lnRef>
-          <a:fillRef idx="1">
-            <a:schemeClr val="lt1"/>
-          </a:fillRef>
-          <a:effectRef idx="0">
-            <a:schemeClr val="accent6"/>
-          </a:effectRef>
-          <a:fontRef idx="minor">
-            <a:schemeClr val="dk1"/>
-          </a:fontRef>
-        </p:style>
-        <p:txBody>
-          <a:bodyPr rtlCol="0" anchor="ctr"/>
-          <a:lstStyle/>
-          <a:p>
-            <a:pPr algn="ctr"/>
-            <a:endParaRPr lang="de-CH"/>
-          </a:p>
-        </p:txBody>
-      </p:sp>
-    </p:spTree>
-    <p:extLst>
-      <p:ext uri="{BB962C8B-B14F-4D97-AF65-F5344CB8AC3E}">
-        <p14:creationId xmlns:p14="http://schemas.microsoft.com/office/powerpoint/2010/main" val="1761734167"/>
+        <p14:creationId xmlns:p14="http://schemas.microsoft.com/office/powerpoint/2010/main" val="3780655319"/>
       </p:ext>
     </p:extLst>
   </p:cSld>

</xml_diff>